<commit_message>
JSheffer - Updated Quick refrence guide
</commit_message>
<xml_diff>
--- a/cucumber/(JS)Introduction to Cucumber.pptx
+++ b/cucumber/(JS)Introduction to Cucumber.pptx
@@ -238,7 +238,7 @@
           <a:p>
             <a:fld id="{C7332281-563B-40DE-B869-7269C9762D99}" type="datetimeFigureOut">
               <a:rPr lang="en-US" smtClean="0"/>
-              <a:t>5/18/2017</a:t>
+              <a:t>5/22/2017</a:t>
             </a:fld>
             <a:endParaRPr lang="en-US"/>
           </a:p>
@@ -4073,7 +4073,7 @@
             <a:fld id="{B61BEF0D-F0BB-DE4B-95CE-6DB70DBA9567}" type="datetimeFigureOut">
               <a:rPr lang="en-US" dirty="0"/>
               <a:pPr/>
-              <a:t>5/18/2017</a:t>
+              <a:t>5/22/2017</a:t>
             </a:fld>
             <a:endParaRPr lang="en-US" dirty="0"/>
           </a:p>
@@ -4321,7 +4321,7 @@
             <a:fld id="{B61BEF0D-F0BB-DE4B-95CE-6DB70DBA9567}" type="datetimeFigureOut">
               <a:rPr lang="en-US" dirty="0"/>
               <a:pPr/>
-              <a:t>5/18/2017</a:t>
+              <a:t>5/22/2017</a:t>
             </a:fld>
             <a:endParaRPr lang="en-US" dirty="0"/>
           </a:p>
@@ -4632,7 +4632,7 @@
             <a:fld id="{B61BEF0D-F0BB-DE4B-95CE-6DB70DBA9567}" type="datetimeFigureOut">
               <a:rPr lang="en-US" dirty="0"/>
               <a:pPr/>
-              <a:t>5/18/2017</a:t>
+              <a:t>5/22/2017</a:t>
             </a:fld>
             <a:endParaRPr lang="en-US" dirty="0"/>
           </a:p>
@@ -4970,7 +4970,7 @@
             <a:fld id="{B61BEF0D-F0BB-DE4B-95CE-6DB70DBA9567}" type="datetimeFigureOut">
               <a:rPr lang="en-US" dirty="0"/>
               <a:pPr/>
-              <a:t>5/18/2017</a:t>
+              <a:t>5/22/2017</a:t>
             </a:fld>
             <a:endParaRPr lang="en-US" dirty="0"/>
           </a:p>
@@ -5281,7 +5281,7 @@
             <a:fld id="{B61BEF0D-F0BB-DE4B-95CE-6DB70DBA9567}" type="datetimeFigureOut">
               <a:rPr lang="en-US" dirty="0"/>
               <a:pPr/>
-              <a:t>5/18/2017</a:t>
+              <a:t>5/22/2017</a:t>
             </a:fld>
             <a:endParaRPr lang="en-US" dirty="0"/>
           </a:p>
@@ -5671,7 +5671,7 @@
             <a:fld id="{B61BEF0D-F0BB-DE4B-95CE-6DB70DBA9567}" type="datetimeFigureOut">
               <a:rPr lang="en-US" dirty="0"/>
               <a:pPr/>
-              <a:t>5/18/2017</a:t>
+              <a:t>5/22/2017</a:t>
             </a:fld>
             <a:endParaRPr lang="en-US" dirty="0"/>
           </a:p>
@@ -5837,7 +5837,7 @@
           <a:p>
             <a:fld id="{55C6B4A9-1611-4792-9094-5F34BCA07E0B}" type="datetimeFigureOut">
               <a:rPr lang="en-US" dirty="0"/>
-              <a:t>5/18/2017</a:t>
+              <a:t>5/22/2017</a:t>
             </a:fld>
             <a:endParaRPr lang="en-US" dirty="0"/>
           </a:p>
@@ -6013,7 +6013,7 @@
             <a:fld id="{B61BEF0D-F0BB-DE4B-95CE-6DB70DBA9567}" type="datetimeFigureOut">
               <a:rPr lang="en-US" dirty="0"/>
               <a:pPr/>
-              <a:t>5/18/2017</a:t>
+              <a:t>5/22/2017</a:t>
             </a:fld>
             <a:endParaRPr lang="en-US" dirty="0"/>
           </a:p>
@@ -6186,7 +6186,7 @@
             <a:fld id="{B61BEF0D-F0BB-DE4B-95CE-6DB70DBA9567}" type="datetimeFigureOut">
               <a:rPr lang="en-US" dirty="0"/>
               <a:pPr/>
-              <a:t>5/18/2017</a:t>
+              <a:t>5/22/2017</a:t>
             </a:fld>
             <a:endParaRPr lang="en-US" dirty="0"/>
           </a:p>
@@ -6430,7 +6430,7 @@
             <a:fld id="{B61BEF0D-F0BB-DE4B-95CE-6DB70DBA9567}" type="datetimeFigureOut">
               <a:rPr lang="en-US" dirty="0"/>
               <a:pPr/>
-              <a:t>5/18/2017</a:t>
+              <a:t>5/22/2017</a:t>
             </a:fld>
             <a:endParaRPr lang="en-US" dirty="0"/>
           </a:p>
@@ -6658,7 +6658,7 @@
           <a:p>
             <a:fld id="{EB712588-04B1-427B-82EE-E8DB90309F08}" type="datetimeFigureOut">
               <a:rPr lang="en-US" dirty="0"/>
-              <a:t>5/18/2017</a:t>
+              <a:t>5/22/2017</a:t>
             </a:fld>
             <a:endParaRPr lang="en-US" dirty="0"/>
           </a:p>
@@ -7028,7 +7028,7 @@
             <a:fld id="{B61BEF0D-F0BB-DE4B-95CE-6DB70DBA9567}" type="datetimeFigureOut">
               <a:rPr lang="en-US" dirty="0"/>
               <a:pPr/>
-              <a:t>5/18/2017</a:t>
+              <a:t>5/22/2017</a:t>
             </a:fld>
             <a:endParaRPr lang="en-US" dirty="0"/>
           </a:p>
@@ -7148,7 +7148,7 @@
             <a:fld id="{B61BEF0D-F0BB-DE4B-95CE-6DB70DBA9567}" type="datetimeFigureOut">
               <a:rPr lang="en-US" dirty="0"/>
               <a:pPr/>
-              <a:t>5/18/2017</a:t>
+              <a:t>5/22/2017</a:t>
             </a:fld>
             <a:endParaRPr lang="en-US" dirty="0"/>
           </a:p>
@@ -7240,7 +7240,7 @@
             <a:fld id="{B61BEF0D-F0BB-DE4B-95CE-6DB70DBA9567}" type="datetimeFigureOut">
               <a:rPr lang="en-US" dirty="0"/>
               <a:pPr/>
-              <a:t>5/18/2017</a:t>
+              <a:t>5/22/2017</a:t>
             </a:fld>
             <a:endParaRPr lang="en-US" dirty="0"/>
           </a:p>
@@ -7491,7 +7491,7 @@
           <a:p>
             <a:fld id="{42A54C80-263E-416B-A8E0-580EDEADCBDC}" type="datetimeFigureOut">
               <a:rPr lang="en-US" dirty="0"/>
-              <a:t>5/18/2017</a:t>
+              <a:t>5/22/2017</a:t>
             </a:fld>
             <a:endParaRPr lang="en-US" dirty="0"/>
           </a:p>
@@ -7750,7 +7750,7 @@
             <a:fld id="{B61BEF0D-F0BB-DE4B-95CE-6DB70DBA9567}" type="datetimeFigureOut">
               <a:rPr lang="en-US" dirty="0"/>
               <a:pPr/>
-              <a:t>5/18/2017</a:t>
+              <a:t>5/22/2017</a:t>
             </a:fld>
             <a:endParaRPr lang="en-US" dirty="0"/>
           </a:p>
@@ -8490,7 +8490,7 @@
             <a:fld id="{B61BEF0D-F0BB-DE4B-95CE-6DB70DBA9567}" type="datetimeFigureOut">
               <a:rPr lang="en-US" dirty="0"/>
               <a:pPr/>
-              <a:t>5/18/2017</a:t>
+              <a:t>5/22/2017</a:t>
             </a:fld>
             <a:endParaRPr lang="en-US" dirty="0"/>
           </a:p>
@@ -11562,6 +11562,13 @@
             </a:r>
           </a:p>
           <a:p>
+            <a:pPr lvl="1"/>
+            <a:r>
+              <a:rPr lang="en-US" sz="2200" dirty="0"/>
+              <a:t>Acceptance Tests are intended to fail at the beginning until the development is completed for the Acceptance Test requirement </a:t>
+            </a:r>
+          </a:p>
+          <a:p>
             <a:endParaRPr lang="en-US" sz="2400" dirty="0"/>
           </a:p>
           <a:p>
@@ -12609,27 +12616,42 @@
               <a:buNone/>
             </a:pPr>
             <a:r>
-              <a:rPr lang="en-US"/>
+              <a:rPr lang="en-US" dirty="0"/>
+              <a:t>Features files have a .feature extension</a:t>
+            </a:r>
+          </a:p>
+          <a:p>
+            <a:pPr marL="457200" lvl="1" indent="0">
+              <a:buNone/>
+            </a:pPr>
+            <a:endParaRPr lang="en-US" dirty="0"/>
+          </a:p>
+          <a:p>
+            <a:pPr marL="457200" lvl="1" indent="0">
+              <a:buNone/>
+            </a:pPr>
+            <a:r>
+              <a:rPr lang="en-US" dirty="0"/>
               <a:t>Features </a:t>
             </a:r>
             <a:r>
-              <a:rPr lang="en-US">
+              <a:rPr lang="en-US" dirty="0">
                 <a:sym typeface="Wingdings" panose="05000000000000000000" pitchFamily="2" charset="2"/>
               </a:rPr>
               <a:t></a:t>
             </a:r>
             <a:r>
-              <a:rPr lang="en-US"/>
+              <a:rPr lang="en-US" dirty="0"/>
               <a:t> Scenarios </a:t>
             </a:r>
             <a:r>
-              <a:rPr lang="en-US">
+              <a:rPr lang="en-US" dirty="0">
                 <a:sym typeface="Wingdings" panose="05000000000000000000" pitchFamily="2" charset="2"/>
               </a:rPr>
               <a:t></a:t>
             </a:r>
             <a:r>
-              <a:rPr lang="en-US"/>
+              <a:rPr lang="en-US" dirty="0"/>
               <a:t> Steps</a:t>
             </a:r>
             <a:endParaRPr lang="en-US" sz="2200" dirty="0"/>

</xml_diff>